<commit_message>
Terminando Práctica 07: Añadir CSS, funcionanlidades y detalles adicionales
</commit_message>
<xml_diff>
--- a/Presentaciones/Clase07.26.06.25.pptx
+++ b/Presentaciones/Clase07.26.06.25.pptx
@@ -8,6 +8,7 @@
     <p:sldId id="256" r:id="rId2"/>
     <p:sldId id="257" r:id="rId3"/>
     <p:sldId id="258" r:id="rId4"/>
+    <p:sldId id="259" r:id="rId5"/>
   </p:sldIdLst>
   <p:sldSz cx="12192000" cy="6858000"/>
   <p:notesSz cx="6858000" cy="9144000"/>
@@ -3747,10 +3748,142 @@
           </a:p>
         </p:txBody>
       </p:sp>
+      <p:sp>
+        <p:nvSpPr>
+          <p:cNvPr id="7" name="CuadroTexto 6">
+            <a:extLst>
+              <a:ext uri="{FF2B5EF4-FFF2-40B4-BE49-F238E27FC236}">
+                <a16:creationId xmlns:a16="http://schemas.microsoft.com/office/drawing/2014/main" id="{3BEF116A-5D07-C378-C3C3-4DB77016B14B}"/>
+              </a:ext>
+            </a:extLst>
+          </p:cNvPr>
+          <p:cNvSpPr txBox="1"/>
+          <p:nvPr/>
+        </p:nvSpPr>
+        <p:spPr>
+          <a:xfrm>
+            <a:off x="8524565" y="650228"/>
+            <a:ext cx="3313471" cy="1754326"/>
+          </a:xfrm>
+          <a:prstGeom prst="rect">
+            <a:avLst/>
+          </a:prstGeom>
+          <a:noFill/>
+        </p:spPr>
+        <p:txBody>
+          <a:bodyPr wrap="square" rtlCol="0">
+            <a:spAutoFit/>
+          </a:bodyPr>
+          <a:lstStyle/>
+          <a:p>
+            <a:r>
+              <a:rPr lang="es-MX" dirty="0"/>
+              <a:t>En la carpeta </a:t>
+            </a:r>
+            <a:r>
+              <a:rPr lang="es-MX" dirty="0" err="1"/>
+              <a:t>components</a:t>
+            </a:r>
+            <a:r>
+              <a:rPr lang="es-MX" dirty="0"/>
+              <a:t>, se albergan elementos llamados complementos, que se encontrarán en múltiples paginas del sitio (como </a:t>
+            </a:r>
+            <a:r>
+              <a:rPr lang="es-MX" dirty="0" err="1"/>
+              <a:t>header</a:t>
+            </a:r>
+            <a:r>
+              <a:rPr lang="es-MX" dirty="0"/>
+              <a:t>, </a:t>
+            </a:r>
+            <a:r>
+              <a:rPr lang="es-MX" dirty="0" err="1"/>
+              <a:t>nav</a:t>
+            </a:r>
+            <a:r>
+              <a:rPr lang="es-MX" dirty="0"/>
+              <a:t> bar, </a:t>
+            </a:r>
+            <a:r>
+              <a:rPr lang="es-MX" dirty="0" err="1"/>
+              <a:t>footer</a:t>
+            </a:r>
+            <a:r>
+              <a:rPr lang="es-MX" dirty="0"/>
+              <a:t>, etc.)</a:t>
+            </a:r>
+          </a:p>
+        </p:txBody>
+      </p:sp>
     </p:spTree>
     <p:extLst>
       <p:ext uri="{BB962C8B-B14F-4D97-AF65-F5344CB8AC3E}">
         <p14:creationId xmlns:p14="http://schemas.microsoft.com/office/powerpoint/2010/main" val="58516710"/>
+      </p:ext>
+    </p:extLst>
+  </p:cSld>
+  <p:clrMapOvr>
+    <a:masterClrMapping/>
+  </p:clrMapOvr>
+</p:sld>
+</file>
+
+<file path=ppt/slides/slide4.xml><?xml version="1.0" encoding="utf-8"?>
+<p:sld xmlns:a="http://schemas.openxmlformats.org/drawingml/2006/main" xmlns:r="http://schemas.openxmlformats.org/officeDocument/2006/relationships" xmlns:p="http://schemas.openxmlformats.org/presentationml/2006/main">
+  <p:cSld>
+    <p:spTree>
+      <p:nvGrpSpPr>
+        <p:cNvPr id="1" name=""/>
+        <p:cNvGrpSpPr/>
+        <p:nvPr/>
+      </p:nvGrpSpPr>
+      <p:grpSpPr>
+        <a:xfrm>
+          <a:off x="0" y="0"/>
+          <a:ext cx="0" cy="0"/>
+          <a:chOff x="0" y="0"/>
+          <a:chExt cx="0" cy="0"/>
+        </a:xfrm>
+      </p:grpSpPr>
+      <p:sp>
+        <p:nvSpPr>
+          <p:cNvPr id="2" name="CuadroTexto 1">
+            <a:extLst>
+              <a:ext uri="{FF2B5EF4-FFF2-40B4-BE49-F238E27FC236}">
+                <a16:creationId xmlns:a16="http://schemas.microsoft.com/office/drawing/2014/main" id="{D2F972F6-A5BF-C40D-5202-CE31C6A23811}"/>
+              </a:ext>
+            </a:extLst>
+          </p:cNvPr>
+          <p:cNvSpPr txBox="1"/>
+          <p:nvPr/>
+        </p:nvSpPr>
+        <p:spPr>
+          <a:xfrm>
+            <a:off x="245806" y="304800"/>
+            <a:ext cx="4935794" cy="369332"/>
+          </a:xfrm>
+          <a:prstGeom prst="rect">
+            <a:avLst/>
+          </a:prstGeom>
+          <a:noFill/>
+        </p:spPr>
+        <p:txBody>
+          <a:bodyPr wrap="square" rtlCol="0">
+            <a:spAutoFit/>
+          </a:bodyPr>
+          <a:lstStyle/>
+          <a:p>
+            <a:r>
+              <a:rPr lang="es-MX" dirty="0"/>
+              <a:t>PROCESO PARA AUTENTICACIONES EN LOGIN</a:t>
+            </a:r>
+          </a:p>
+        </p:txBody>
+      </p:sp>
+    </p:spTree>
+    <p:extLst>
+      <p:ext uri="{BB962C8B-B14F-4D97-AF65-F5344CB8AC3E}">
+        <p14:creationId xmlns:p14="http://schemas.microsoft.com/office/powerpoint/2010/main" val="1019714910"/>
       </p:ext>
     </p:extLst>
   </p:cSld>

</xml_diff>